<commit_message>
update aref pin connect to 5V
</commit_message>
<xml_diff>
--- a/short-circuit-limiter/short-circuit-limiter-instructions.pptx
+++ b/short-circuit-limiter/short-circuit-limiter-instructions.pptx
@@ -247,7 +247,7 @@
           <a:p>
             <a:fld id="{00808A92-602D-7A4F-BD0D-BC2312DEE103}" type="datetimeFigureOut">
               <a:rPr lang="en-US" smtClean="0"/>
-              <a:t>7/26/2017</a:t>
+              <a:t>9/17/2017</a:t>
             </a:fld>
             <a:endParaRPr lang="en-US"/>
           </a:p>
@@ -417,7 +417,7 @@
           <a:p>
             <a:fld id="{00808A92-602D-7A4F-BD0D-BC2312DEE103}" type="datetimeFigureOut">
               <a:rPr lang="en-US" smtClean="0"/>
-              <a:t>7/26/2017</a:t>
+              <a:t>9/17/2017</a:t>
             </a:fld>
             <a:endParaRPr lang="en-US"/>
           </a:p>
@@ -597,7 +597,7 @@
           <a:p>
             <a:fld id="{00808A92-602D-7A4F-BD0D-BC2312DEE103}" type="datetimeFigureOut">
               <a:rPr lang="en-US" smtClean="0"/>
-              <a:t>7/26/2017</a:t>
+              <a:t>9/17/2017</a:t>
             </a:fld>
             <a:endParaRPr lang="en-US"/>
           </a:p>
@@ -767,7 +767,7 @@
           <a:p>
             <a:fld id="{00808A92-602D-7A4F-BD0D-BC2312DEE103}" type="datetimeFigureOut">
               <a:rPr lang="en-US" smtClean="0"/>
-              <a:t>7/26/2017</a:t>
+              <a:t>9/17/2017</a:t>
             </a:fld>
             <a:endParaRPr lang="en-US"/>
           </a:p>
@@ -1011,7 +1011,7 @@
           <a:p>
             <a:fld id="{00808A92-602D-7A4F-BD0D-BC2312DEE103}" type="datetimeFigureOut">
               <a:rPr lang="en-US" smtClean="0"/>
-              <a:t>7/26/2017</a:t>
+              <a:t>9/17/2017</a:t>
             </a:fld>
             <a:endParaRPr lang="en-US"/>
           </a:p>
@@ -1243,7 +1243,7 @@
           <a:p>
             <a:fld id="{00808A92-602D-7A4F-BD0D-BC2312DEE103}" type="datetimeFigureOut">
               <a:rPr lang="en-US" smtClean="0"/>
-              <a:t>7/26/2017</a:t>
+              <a:t>9/17/2017</a:t>
             </a:fld>
             <a:endParaRPr lang="en-US"/>
           </a:p>
@@ -1610,7 +1610,7 @@
           <a:p>
             <a:fld id="{00808A92-602D-7A4F-BD0D-BC2312DEE103}" type="datetimeFigureOut">
               <a:rPr lang="en-US" smtClean="0"/>
-              <a:t>7/26/2017</a:t>
+              <a:t>9/17/2017</a:t>
             </a:fld>
             <a:endParaRPr lang="en-US"/>
           </a:p>
@@ -1728,7 +1728,7 @@
           <a:p>
             <a:fld id="{00808A92-602D-7A4F-BD0D-BC2312DEE103}" type="datetimeFigureOut">
               <a:rPr lang="en-US" smtClean="0"/>
-              <a:t>7/26/2017</a:t>
+              <a:t>9/17/2017</a:t>
             </a:fld>
             <a:endParaRPr lang="en-US"/>
           </a:p>
@@ -1823,7 +1823,7 @@
           <a:p>
             <a:fld id="{00808A92-602D-7A4F-BD0D-BC2312DEE103}" type="datetimeFigureOut">
               <a:rPr lang="en-US" smtClean="0"/>
-              <a:t>7/26/2017</a:t>
+              <a:t>9/17/2017</a:t>
             </a:fld>
             <a:endParaRPr lang="en-US"/>
           </a:p>
@@ -2100,7 +2100,7 @@
           <a:p>
             <a:fld id="{00808A92-602D-7A4F-BD0D-BC2312DEE103}" type="datetimeFigureOut">
               <a:rPr lang="en-US" smtClean="0"/>
-              <a:t>7/26/2017</a:t>
+              <a:t>9/17/2017</a:t>
             </a:fld>
             <a:endParaRPr lang="en-US"/>
           </a:p>
@@ -2357,7 +2357,7 @@
           <a:p>
             <a:fld id="{00808A92-602D-7A4F-BD0D-BC2312DEE103}" type="datetimeFigureOut">
               <a:rPr lang="en-US" smtClean="0"/>
-              <a:t>7/26/2017</a:t>
+              <a:t>9/17/2017</a:t>
             </a:fld>
             <a:endParaRPr lang="en-US"/>
           </a:p>
@@ -2570,7 +2570,7 @@
           <a:p>
             <a:fld id="{00808A92-602D-7A4F-BD0D-BC2312DEE103}" type="datetimeFigureOut">
               <a:rPr lang="en-US" smtClean="0"/>
-              <a:t>7/26/2017</a:t>
+              <a:t>9/17/2017</a:t>
             </a:fld>
             <a:endParaRPr lang="en-US"/>
           </a:p>
@@ -3151,28 +3151,28 @@
       </p:sp>
       <p:pic>
         <p:nvPicPr>
-          <p:cNvPr id="2" name="Picture 1"/>
+          <p:cNvPr id="6" name="Picture 5">
+            <a:extLst>
+              <a:ext uri="{FF2B5EF4-FFF2-40B4-BE49-F238E27FC236}">
+                <a16:creationId xmlns:a16="http://schemas.microsoft.com/office/drawing/2014/main" id="{7D1FC104-B8A5-4D7F-84A6-43CC3E670180}"/>
+              </a:ext>
+            </a:extLst>
+          </p:cNvPr>
           <p:cNvPicPr>
             <a:picLocks noChangeAspect="1"/>
           </p:cNvPicPr>
           <p:nvPr/>
         </p:nvPicPr>
         <p:blipFill>
-          <a:blip r:embed="rId2">
-            <a:extLst>
-              <a:ext uri="{28A0092B-C50C-407E-A947-70E740481C1C}">
-                <a14:useLocalDpi xmlns:a14="http://schemas.microsoft.com/office/drawing/2010/main" val="0"/>
-              </a:ext>
-            </a:extLst>
-          </a:blip>
+          <a:blip r:embed="rId2"/>
           <a:stretch>
             <a:fillRect/>
           </a:stretch>
         </p:blipFill>
         <p:spPr>
           <a:xfrm>
-            <a:off x="1" y="945765"/>
-            <a:ext cx="5328920" cy="2173304"/>
+            <a:off x="1" y="930876"/>
+            <a:ext cx="5328921" cy="2211228"/>
           </a:xfrm>
           <a:prstGeom prst="rect">
             <a:avLst/>

</xml_diff>